<commit_message>
removing workshop markdown, now all in powerpoint
</commit_message>
<xml_diff>
--- a/doc/workshop_slides.pptx
+++ b/doc/workshop_slides.pptx
@@ -609,6 +609,93 @@
           <a:bodyPr/>
           <a:lstStyle/>
           <a:p>
+            <a:r>
+              <a:rPr lang="en-NZ" dirty="0"/>
+              <a:t>NESI also have lots of great workshops! Command line, machine learning</a:t>
+            </a:r>
+          </a:p>
+        </p:txBody>
+      </p:sp>
+      <p:sp>
+        <p:nvSpPr>
+          <p:cNvPr id="4" name="Slide Number Placeholder 3"/>
+          <p:cNvSpPr>
+            <a:spLocks noGrp="1"/>
+          </p:cNvSpPr>
+          <p:nvPr>
+            <p:ph type="sldNum" sz="quarter" idx="5"/>
+          </p:nvPr>
+        </p:nvSpPr>
+        <p:spPr/>
+        <p:txBody>
+          <a:bodyPr/>
+          <a:lstStyle/>
+          <a:p>
+            <a:fld id="{947B6143-73A9-458D-A6CA-502343DEF7E9}" type="slidenum">
+              <a:rPr lang="en-NZ" smtClean="0"/>
+              <a:t>10</a:t>
+            </a:fld>
+            <a:endParaRPr lang="en-NZ"/>
+          </a:p>
+        </p:txBody>
+      </p:sp>
+    </p:spTree>
+    <p:extLst>
+      <p:ext uri="{BB962C8B-B14F-4D97-AF65-F5344CB8AC3E}">
+        <p14:creationId xmlns:p14="http://schemas.microsoft.com/office/powerpoint/2010/main" val="1430325904"/>
+      </p:ext>
+    </p:extLst>
+  </p:cSld>
+  <p:clrMapOvr>
+    <a:masterClrMapping/>
+  </p:clrMapOvr>
+</p:notes>
+</file>
+
+<file path=ppt/notesSlides/notesSlide11.xml><?xml version="1.0" encoding="utf-8"?>
+<p:notes xmlns:a="http://schemas.openxmlformats.org/drawingml/2006/main" xmlns:r="http://schemas.openxmlformats.org/officeDocument/2006/relationships" xmlns:p="http://schemas.openxmlformats.org/presentationml/2006/main">
+  <p:cSld>
+    <p:spTree>
+      <p:nvGrpSpPr>
+        <p:cNvPr id="1" name=""/>
+        <p:cNvGrpSpPr/>
+        <p:nvPr/>
+      </p:nvGrpSpPr>
+      <p:grpSpPr>
+        <a:xfrm>
+          <a:off x="0" y="0"/>
+          <a:ext cx="0" cy="0"/>
+          <a:chOff x="0" y="0"/>
+          <a:chExt cx="0" cy="0"/>
+        </a:xfrm>
+      </p:grpSpPr>
+      <p:sp>
+        <p:nvSpPr>
+          <p:cNvPr id="2" name="Slide Image Placeholder 1"/>
+          <p:cNvSpPr>
+            <a:spLocks noGrp="1" noRot="1" noChangeAspect="1"/>
+          </p:cNvSpPr>
+          <p:nvPr>
+            <p:ph type="sldImg"/>
+          </p:nvPr>
+        </p:nvSpPr>
+        <p:spPr/>
+      </p:sp>
+      <p:sp>
+        <p:nvSpPr>
+          <p:cNvPr id="3" name="Notes Placeholder 2"/>
+          <p:cNvSpPr>
+            <a:spLocks noGrp="1"/>
+          </p:cNvSpPr>
+          <p:nvPr>
+            <p:ph type="body" idx="1"/>
+          </p:nvPr>
+        </p:nvSpPr>
+        <p:spPr/>
+        <p:txBody>
+          <a:bodyPr/>
+          <a:lstStyle/>
+          <a:p>
             <a:endParaRPr lang="en-NZ" dirty="0"/>
           </a:p>
         </p:txBody>
@@ -649,7 +736,7 @@
 </p:notes>
 </file>
 
-<file path=ppt/notesSlides/notesSlide11.xml><?xml version="1.0" encoding="utf-8"?>
+<file path=ppt/notesSlides/notesSlide12.xml><?xml version="1.0" encoding="utf-8"?>
 <p:notes xmlns:a="http://schemas.openxmlformats.org/drawingml/2006/main" xmlns:r="http://schemas.openxmlformats.org/officeDocument/2006/relationships" xmlns:p="http://schemas.openxmlformats.org/presentationml/2006/main">
   <p:cSld>
     <p:spTree>
@@ -1625,27 +1712,8 @@
           <a:p>
             <a:r>
               <a:rPr lang="en-NZ" dirty="0"/>
-              <a:t>Undoing changes is not only for undoing edits to a file, but also for bringing back entire deleted files. (Just so long as the file had been committed previously, and not in .</a:t>
-            </a:r>
-            <a:r>
-              <a:rPr lang="en-NZ" dirty="0" err="1"/>
-              <a:t>gitignore</a:t>
-            </a:r>
-            <a:r>
-              <a:rPr lang="en-NZ" dirty="0"/>
-              <a:t>!)</a:t>
-            </a:r>
-          </a:p>
-          <a:p>
-            <a:r>
-              <a:rPr lang="en-NZ" dirty="0"/>
-              <a:t>How to find commit hash? Git log, or handy VS code Source </a:t>
-            </a:r>
-            <a:r>
-              <a:rPr lang="en-NZ"/>
-              <a:t>Control Graph</a:t>
-            </a:r>
-            <a:endParaRPr lang="en-NZ" dirty="0"/>
+              <a:t>If we don’t commit the data, make sure you have a script that downloads it, or other description of how to access it.</a:t>
+            </a:r>
           </a:p>
         </p:txBody>
       </p:sp>
@@ -1666,7 +1734,7 @@
           <a:p>
             <a:fld id="{947B6143-73A9-458D-A6CA-502343DEF7E9}" type="slidenum">
               <a:rPr lang="en-NZ" smtClean="0"/>
-              <a:t>9</a:t>
+              <a:t>8</a:t>
             </a:fld>
             <a:endParaRPr lang="en-NZ"/>
           </a:p>
@@ -1675,7 +1743,7 @@
     </p:spTree>
     <p:extLst>
       <p:ext uri="{BB962C8B-B14F-4D97-AF65-F5344CB8AC3E}">
-        <p14:creationId xmlns:p14="http://schemas.microsoft.com/office/powerpoint/2010/main" val="3965041065"/>
+        <p14:creationId xmlns:p14="http://schemas.microsoft.com/office/powerpoint/2010/main" val="3140737604"/>
       </p:ext>
     </p:extLst>
   </p:cSld>
@@ -1731,7 +1799,21 @@
           <a:p>
             <a:r>
               <a:rPr lang="en-NZ" dirty="0"/>
-              <a:t>NESI also have lots of great workshops! Command line, machine learning</a:t>
+              <a:t>Undoing changes is not only for undoing edits to a file, but also for bringing back entire deleted files. (Just so long as the file had been committed previously, and not in .</a:t>
+            </a:r>
+            <a:r>
+              <a:rPr lang="en-NZ" dirty="0" err="1"/>
+              <a:t>gitignore</a:t>
+            </a:r>
+            <a:r>
+              <a:rPr lang="en-NZ" dirty="0"/>
+              <a:t>!)</a:t>
+            </a:r>
+          </a:p>
+          <a:p>
+            <a:r>
+              <a:rPr lang="en-NZ" dirty="0"/>
+              <a:t>How to find commit hash? Git log, or handy VS code Source Control Graph</a:t>
             </a:r>
           </a:p>
         </p:txBody>
@@ -1753,7 +1835,7 @@
           <a:p>
             <a:fld id="{947B6143-73A9-458D-A6CA-502343DEF7E9}" type="slidenum">
               <a:rPr lang="en-NZ" smtClean="0"/>
-              <a:t>10</a:t>
+              <a:t>9</a:t>
             </a:fld>
             <a:endParaRPr lang="en-NZ"/>
           </a:p>
@@ -1762,7 +1844,7 @@
     </p:spTree>
     <p:extLst>
       <p:ext uri="{BB962C8B-B14F-4D97-AF65-F5344CB8AC3E}">
-        <p14:creationId xmlns:p14="http://schemas.microsoft.com/office/powerpoint/2010/main" val="1430325904"/>
+        <p14:creationId xmlns:p14="http://schemas.microsoft.com/office/powerpoint/2010/main" val="3965041065"/>
       </p:ext>
     </p:extLst>
   </p:cSld>
@@ -5250,7 +5332,7 @@
         <p:spPr>
           <a:xfrm>
             <a:off x="7900396" y="2172367"/>
-            <a:ext cx="3019423" cy="4076700"/>
+            <a:ext cx="3335451" cy="4076700"/>
           </a:xfrm>
         </p:spPr>
         <p:txBody>
@@ -5373,8 +5455,8 @@
         </p:blipFill>
         <p:spPr bwMode="auto">
           <a:xfrm>
-            <a:off x="8076294" y="1885949"/>
-            <a:ext cx="2319744" cy="1217865"/>
+            <a:off x="7900396" y="1858961"/>
+            <a:ext cx="2657461" cy="1395166"/>
           </a:xfrm>
           <a:prstGeom prst="rect">
             <a:avLst/>
@@ -8012,7 +8094,7 @@
             </a:pPr>
             <a:r>
               <a:rPr lang="en-US" dirty="0"/>
-              <a:t>Pull requests and other intermediate/advanced aspects of Git</a:t>
+              <a:t>Branches, pull requests and other intermediate/advanced aspects of Git (unless we have time and interest)</a:t>
             </a:r>
           </a:p>
           <a:p>
@@ -8747,7 +8829,7 @@
             <a:pPr lvl="1"/>
             <a:r>
               <a:rPr lang="en-NZ" dirty="0"/>
-              <a:t>Git (can provide link to step-by-step instructions)</a:t>
+              <a:t>Git (see file doc/git_setup_guide.md for details)</a:t>
             </a:r>
           </a:p>
           <a:p>
@@ -8979,7 +9061,7 @@
         <p:spPr>
           <a:xfrm>
             <a:off x="700088" y="1783831"/>
-            <a:ext cx="6787832" cy="4178057"/>
+            <a:ext cx="6928263" cy="4178057"/>
           </a:xfrm>
         </p:spPr>
         <p:txBody>
@@ -9017,7 +9099,7 @@
             </a:pPr>
             <a:r>
               <a:rPr lang="en-NZ" dirty="0"/>
-              <a:t>Set of principles and practises in programming and documentation that ensure</a:t>
+              <a:t>Set of principles and practices in scientific computing (version control, documentation, virtual environments, etc.) that ensure</a:t>
             </a:r>
           </a:p>
           <a:p>
@@ -9061,7 +9143,7 @@
             </a:pPr>
             <a:r>
               <a:rPr lang="en-NZ" dirty="0"/>
-              <a:t>3 key pillars</a:t>
+              <a:t>Allows your work to be understood and trusted by</a:t>
             </a:r>
           </a:p>
           <a:p>
@@ -9072,7 +9154,7 @@
             </a:pPr>
             <a:r>
               <a:rPr lang="en-NZ" sz="2000" dirty="0"/>
-              <a:t>Project structure</a:t>
+              <a:t>Yourself, 6 months from now</a:t>
             </a:r>
           </a:p>
           <a:p>
@@ -9083,7 +9165,7 @@
             </a:pPr>
             <a:r>
               <a:rPr lang="en-NZ" sz="2000" dirty="0"/>
-              <a:t>Version control</a:t>
+              <a:t>Your supervisor and colleagues</a:t>
             </a:r>
           </a:p>
           <a:p>
@@ -9094,7 +9176,7 @@
             </a:pPr>
             <a:r>
               <a:rPr lang="en-NZ" sz="2000" dirty="0"/>
-              <a:t>Virtual environments</a:t>
+              <a:t>The scientific community at large</a:t>
             </a:r>
           </a:p>
         </p:txBody>
@@ -9268,6 +9350,91 @@
               <a:t>5</a:t>
             </a:fld>
             <a:endParaRPr lang="en-US"/>
+          </a:p>
+        </p:txBody>
+      </p:sp>
+      <p:sp>
+        <p:nvSpPr>
+          <p:cNvPr id="4" name="Title 1">
+            <a:extLst>
+              <a:ext uri="{FF2B5EF4-FFF2-40B4-BE49-F238E27FC236}">
+                <a16:creationId xmlns:a16="http://schemas.microsoft.com/office/drawing/2014/main" id="{A1C8189B-9996-0120-7AE8-BE9763757A4C}"/>
+              </a:ext>
+            </a:extLst>
+          </p:cNvPr>
+          <p:cNvSpPr txBox="1">
+            <a:spLocks/>
+          </p:cNvSpPr>
+          <p:nvPr/>
+        </p:nvSpPr>
+        <p:spPr>
+          <a:xfrm>
+            <a:off x="7155811" y="1804770"/>
+            <a:ext cx="4652937" cy="512439"/>
+          </a:xfrm>
+          <a:prstGeom prst="rect">
+            <a:avLst/>
+          </a:prstGeom>
+          <a:ln>
+            <a:solidFill>
+              <a:schemeClr val="tx1"/>
+            </a:solidFill>
+          </a:ln>
+        </p:spPr>
+        <p:txBody>
+          <a:bodyPr vert="horz" lIns="91440" tIns="45720" rIns="91440" bIns="45720" rtlCol="0" anchor="t">
+            <a:normAutofit fontScale="92500" lnSpcReduction="20000"/>
+          </a:bodyPr>
+          <a:lstStyle>
+            <a:lvl1pPr algn="l" defTabSz="914400" rtl="0" eaLnBrk="1" latinLnBrk="0" hangingPunct="1">
+              <a:lnSpc>
+                <a:spcPct val="100000"/>
+              </a:lnSpc>
+              <a:spcBef>
+                <a:spcPct val="0"/>
+              </a:spcBef>
+              <a:buNone/>
+              <a:defRPr sz="4000" kern="1200" cap="all" spc="30" baseline="0">
+                <a:solidFill>
+                  <a:schemeClr val="tx1"/>
+                </a:solidFill>
+                <a:latin typeface="+mj-lt"/>
+                <a:ea typeface="+mj-ea"/>
+                <a:cs typeface="+mj-cs"/>
+              </a:defRPr>
+            </a:lvl1pPr>
+          </a:lstStyle>
+          <a:p>
+            <a:r>
+              <a:rPr lang="en-NZ" sz="1800" b="1" dirty="0"/>
+              <a:t>Nice paper: </a:t>
+            </a:r>
+            <a:r>
+              <a:rPr lang="en-US" sz="1800" dirty="0">
+                <a:hlinkClick r:id="rId5"/>
+              </a:rPr>
+              <a:t>Good enough practices in scientific computing (Wilson et al., 2017)</a:t>
+            </a:r>
+            <a:endParaRPr kumimoji="0" lang="en-NZ" sz="1800" i="0" u="none" strike="noStrike" kern="1200" cap="none" spc="0" normalizeH="0" baseline="0" noProof="0" dirty="0">
+              <a:ln>
+                <a:noFill/>
+              </a:ln>
+              <a:solidFill>
+                <a:srgbClr val="000000"/>
+              </a:solidFill>
+              <a:effectLst/>
+              <a:uLnTx/>
+              <a:uFillTx/>
+              <a:latin typeface="Consolas" panose="020B0609020204030204" pitchFamily="49" charset="0"/>
+              <a:ea typeface="+mn-ea"/>
+              <a:cs typeface="Courier New" panose="02070309020205020404" pitchFamily="49" charset="0"/>
+            </a:endParaRPr>
+          </a:p>
+          <a:p>
+            <a:endParaRPr lang="en-NZ" sz="1800" b="1" dirty="0"/>
+          </a:p>
+          <a:p>
+            <a:endParaRPr lang="en-NZ" sz="1800" b="1" dirty="0"/>
           </a:p>
         </p:txBody>
       </p:sp>
@@ -9787,13 +9954,18 @@
               <a:buAutoNum type="arabicPeriod"/>
             </a:pPr>
             <a:r>
-              <a:rPr lang="en-NZ" dirty="0"/>
+              <a:rPr lang="en-NZ" dirty="0">
+                <a:hlinkClick r:id="rId3"/>
+              </a:rPr>
               <a:t>Go to github.com, search </a:t>
             </a:r>
             <a:r>
-              <a:rPr lang="en-NZ" b="1" dirty="0"/>
+              <a:rPr lang="en-NZ" b="1" dirty="0">
+                <a:hlinkClick r:id="rId3"/>
+              </a:rPr>
               <a:t>snap research template</a:t>
             </a:r>
+            <a:endParaRPr lang="en-NZ" b="1" dirty="0"/>
           </a:p>
           <a:p>
             <a:pPr marL="457200" indent="-457200">
@@ -9968,15 +10140,15 @@
           <p:nvPr/>
         </p:nvPicPr>
         <p:blipFill>
-          <a:blip r:embed="rId3"/>
+          <a:blip r:embed="rId4"/>
           <a:stretch>
             <a:fillRect/>
           </a:stretch>
         </p:blipFill>
         <p:spPr>
           <a:xfrm>
-            <a:off x="1162050" y="2942844"/>
-            <a:ext cx="2033123" cy="586740"/>
+            <a:off x="1249732" y="2967896"/>
+            <a:ext cx="1806619" cy="521373"/>
           </a:xfrm>
           <a:prstGeom prst="rect">
             <a:avLst/>
@@ -10385,21 +10557,7 @@
                 <a:latin typeface="Consolas" panose="020B0609020204030204" pitchFamily="49" charset="0"/>
                 <a:cs typeface="Courier New" panose="02070309020205020404" pitchFamily="49" charset="0"/>
               </a:rPr>
-              <a:t>git commit –m “informative-commit-</a:t>
-            </a:r>
-            <a:r>
-              <a:rPr lang="en-NZ" b="1" dirty="0" err="1">
-                <a:latin typeface="Consolas" panose="020B0609020204030204" pitchFamily="49" charset="0"/>
-                <a:cs typeface="Courier New" panose="02070309020205020404" pitchFamily="49" charset="0"/>
-              </a:rPr>
-              <a:t>mssg</a:t>
-            </a:r>
-            <a:r>
-              <a:rPr lang="en-NZ" b="1" dirty="0">
-                <a:latin typeface="Consolas" panose="020B0609020204030204" pitchFamily="49" charset="0"/>
-                <a:cs typeface="Courier New" panose="02070309020205020404" pitchFamily="49" charset="0"/>
-              </a:rPr>
-              <a:t>”</a:t>
+              <a:t>git commit –m “concise but informative description of changes”</a:t>
             </a:r>
           </a:p>
           <a:p>
@@ -10979,7 +11137,7 @@
             </a:pPr>
             <a:r>
               <a:rPr lang="en-NZ" b="1" dirty="0"/>
-              <a:t>What if I only wanted to ignore the raw data, not the processed stuff?</a:t>
+              <a:t>What if you only wanted to ignore the raw data, and share the processed stuff?</a:t>
             </a:r>
           </a:p>
           <a:p>
@@ -11142,7 +11300,7 @@
             </a:r>
             <a:r>
               <a:rPr lang="en-US" dirty="0"/>
-              <a:t>Up to you how to do it: doesn't need to be anything fancy. Think about where the code and output should go, a good name for it, etc.</a:t>
+              <a:t>Up to you how to do it: doesn't need to be fancy. Think about where the code and output should go, a good name for it. Make sure can run from terminal.</a:t>
             </a:r>
           </a:p>
           <a:p>

</xml_diff>

<commit_message>
updating docs, name of get data script
</commit_message>
<xml_diff>
--- a/doc/workshop_slides.pptx
+++ b/doc/workshop_slides.pptx
@@ -210,7 +210,7 @@
           <a:p>
             <a:fld id="{31E259F6-5D16-49F4-9053-65E8E6B860B5}" type="datetimeFigureOut">
               <a:rPr lang="en-NZ" smtClean="0"/>
-              <a:t>19/02/2025</a:t>
+              <a:t>20/02/2025</a:t>
             </a:fld>
             <a:endParaRPr lang="en-NZ"/>
           </a:p>
@@ -2007,7 +2007,7 @@
           <a:p>
             <a:fld id="{FC7D2D4B-A132-4145-B888-10DED0B8E5F0}" type="datetime1">
               <a:rPr lang="en-US" smtClean="0"/>
-              <a:t>2/19/2025</a:t>
+              <a:t>2/20/2025</a:t>
             </a:fld>
             <a:endParaRPr lang="en-US"/>
           </a:p>
@@ -2207,7 +2207,7 @@
           <a:p>
             <a:fld id="{33F1754E-921B-4830-955A-57DA37DCA3D6}" type="datetime1">
               <a:rPr lang="en-US" smtClean="0"/>
-              <a:t>2/19/2025</a:t>
+              <a:t>2/20/2025</a:t>
             </a:fld>
             <a:endParaRPr lang="en-US"/>
           </a:p>
@@ -2417,7 +2417,7 @@
           <a:p>
             <a:fld id="{2ECC17DD-231A-4157-A85A-924C5FA2F0F1}" type="datetime1">
               <a:rPr lang="en-US" smtClean="0"/>
-              <a:t>2/19/2025</a:t>
+              <a:t>2/20/2025</a:t>
             </a:fld>
             <a:endParaRPr lang="en-US"/>
           </a:p>
@@ -2617,7 +2617,7 @@
           <a:p>
             <a:fld id="{517BBA3C-8EA5-460B-8CAD-02F83FDB2630}" type="datetime1">
               <a:rPr lang="en-US" smtClean="0"/>
-              <a:t>2/19/2025</a:t>
+              <a:t>2/20/2025</a:t>
             </a:fld>
             <a:endParaRPr lang="en-US"/>
           </a:p>
@@ -2893,7 +2893,7 @@
           <a:p>
             <a:fld id="{E0EC3A70-AEA5-463D-AB5C-17F27631C386}" type="datetime1">
               <a:rPr lang="en-US" smtClean="0"/>
-              <a:t>2/19/2025</a:t>
+              <a:t>2/20/2025</a:t>
             </a:fld>
             <a:endParaRPr lang="en-US"/>
           </a:p>
@@ -3166,7 +3166,7 @@
           <a:p>
             <a:fld id="{1ECBF030-A4B7-4EF8-B4E3-100EDEF1A6F7}" type="datetime1">
               <a:rPr lang="en-US" smtClean="0"/>
-              <a:t>2/19/2025</a:t>
+              <a:t>2/20/2025</a:t>
             </a:fld>
             <a:endParaRPr lang="en-US"/>
           </a:p>
@@ -3589,7 +3589,7 @@
           <a:p>
             <a:fld id="{CE023F6F-882C-43FF-A474-D6D3281C3010}" type="datetime1">
               <a:rPr lang="en-US" smtClean="0"/>
-              <a:t>2/19/2025</a:t>
+              <a:t>2/20/2025</a:t>
             </a:fld>
             <a:endParaRPr lang="en-US"/>
           </a:p>
@@ -3731,7 +3731,7 @@
           <a:p>
             <a:fld id="{EEEE9754-6607-4455-AC5A-287689C1D9BB}" type="datetime1">
               <a:rPr lang="en-US" smtClean="0"/>
-              <a:t>2/19/2025</a:t>
+              <a:t>2/20/2025</a:t>
             </a:fld>
             <a:endParaRPr lang="en-US"/>
           </a:p>
@@ -3844,7 +3844,7 @@
           <a:p>
             <a:fld id="{B60453A4-2A69-4B25-A81F-E43D92F1BCC5}" type="datetime1">
               <a:rPr lang="en-US" smtClean="0"/>
-              <a:t>2/19/2025</a:t>
+              <a:t>2/20/2025</a:t>
             </a:fld>
             <a:endParaRPr lang="en-US"/>
           </a:p>
@@ -4157,7 +4157,7 @@
           <a:p>
             <a:fld id="{121CD1DA-02FD-4D21-AB5C-3CE06C1DF49A}" type="datetime1">
               <a:rPr lang="en-US" smtClean="0"/>
-              <a:t>2/19/2025</a:t>
+              <a:t>2/20/2025</a:t>
             </a:fld>
             <a:endParaRPr lang="en-US"/>
           </a:p>
@@ -4450,7 +4450,7 @@
           <a:p>
             <a:fld id="{A99A0B8A-5A40-4D44-8F80-EB2F71CD1981}" type="datetime1">
               <a:rPr lang="en-US" smtClean="0"/>
-              <a:t>2/19/2025</a:t>
+              <a:t>2/20/2025</a:t>
             </a:fld>
             <a:endParaRPr lang="en-US"/>
           </a:p>
@@ -4692,7 +4692,7 @@
           <a:p>
             <a:fld id="{8C4CD005-E869-4B32-8BD6-0C7643B6A894}" type="datetime1">
               <a:rPr lang="en-US" smtClean="0"/>
-              <a:t>2/19/2025</a:t>
+              <a:t>2/20/2025</a:t>
             </a:fld>
             <a:endParaRPr lang="en-US"/>
           </a:p>
@@ -8029,13 +8029,13 @@
   <p:clrMapOvr>
     <a:masterClrMapping/>
   </p:clrMapOvr>
-  <mc:AlternateContent xmlns:mc="http://schemas.openxmlformats.org/markup-compatibility/2006">
-    <mc:Choice xmlns:p159="http://schemas.microsoft.com/office/powerpoint/2015/09/main" Requires="p159">
+  <mc:AlternateContent xmlns:mc="http://schemas.openxmlformats.org/markup-compatibility/2006" xmlns:p159="http://schemas.microsoft.com/office/powerpoint/2015/09/main">
+    <mc:Choice Requires="p159">
       <p:transition xmlns:p14="http://schemas.microsoft.com/office/powerpoint/2010/main" spd="slow" p14:dur="2000">
         <p159:morph option="byObject"/>
       </p:transition>
     </mc:Choice>
-    <mc:Fallback>
+    <mc:Fallback xmlns="">
       <p:transition spd="slow">
         <p:fade/>
       </p:transition>
@@ -9042,8 +9042,15 @@
             <a:pPr lvl="1"/>
             <a:r>
               <a:rPr lang="en-NZ" dirty="0"/>
-              <a:t>Git (see file doc/git_setup_guide.md for details)</a:t>
-            </a:r>
+              <a:t>Git: check you are configured with </a:t>
+            </a:r>
+            <a:r>
+              <a:rPr lang="en-NZ" dirty="0">
+                <a:latin typeface="Consolas" panose="020B0609020204030204" pitchFamily="49" charset="0"/>
+              </a:rPr>
+              <a:t>git config --list</a:t>
+            </a:r>
+            <a:endParaRPr lang="en-NZ" dirty="0"/>
           </a:p>
           <a:p>
             <a:pPr lvl="1"/>

</xml_diff>